<commit_message>
Final update for presentation on meeting monday
</commit_message>
<xml_diff>
--- a/WeeklyPresentations/update1_02_11.pptx
+++ b/WeeklyPresentations/update1_02_11.pptx
@@ -16,7 +16,17 @@
     <p:sldId id="265" r:id="rId10"/>
     <p:sldId id="266" r:id="rId11"/>
     <p:sldId id="267" r:id="rId12"/>
-    <p:sldId id="264" r:id="rId13"/>
+    <p:sldId id="269" r:id="rId13"/>
+    <p:sldId id="268" r:id="rId14"/>
+    <p:sldId id="270" r:id="rId15"/>
+    <p:sldId id="271" r:id="rId16"/>
+    <p:sldId id="272" r:id="rId17"/>
+    <p:sldId id="273" r:id="rId18"/>
+    <p:sldId id="274" r:id="rId19"/>
+    <p:sldId id="275" r:id="rId20"/>
+    <p:sldId id="276" r:id="rId21"/>
+    <p:sldId id="277" r:id="rId22"/>
+    <p:sldId id="264" r:id="rId23"/>
   </p:sldIdLst>
   <p:sldSz cx="12192000" cy="6858000"/>
   <p:notesSz cx="6858000" cy="9144000"/>
@@ -115,6 +125,11 @@
       </a:defRPr>
     </a:lvl9pPr>
   </p:defaultTextStyle>
+  <p:extLst>
+    <p:ext uri="{EFAFB233-063F-42B5-8137-9DF3F51BA10A}">
+      <p15:sldGuideLst xmlns:p15="http://schemas.microsoft.com/office/powerpoint/2012/main"/>
+    </p:ext>
+  </p:extLst>
 </p:presentation>
 </file>
 
@@ -307,7 +322,7 @@
             <a:fld id="{B61BEF0D-F0BB-DE4B-95CE-6DB70DBA9567}" type="datetimeFigureOut">
               <a:rPr lang="en-US" dirty="0"/>
               <a:pPr/>
-              <a:t>2/10/2019</a:t>
+              <a:t>2/11/2019</a:t>
             </a:fld>
             <a:endParaRPr lang="en-US" dirty="0"/>
           </a:p>
@@ -642,7 +657,7 @@
             <a:fld id="{B61BEF0D-F0BB-DE4B-95CE-6DB70DBA9567}" type="datetimeFigureOut">
               <a:rPr lang="en-US" dirty="0"/>
               <a:pPr/>
-              <a:t>2/10/2019</a:t>
+              <a:t>2/11/2019</a:t>
             </a:fld>
             <a:endParaRPr lang="en-US" dirty="0"/>
           </a:p>
@@ -1040,7 +1055,7 @@
             <a:fld id="{B61BEF0D-F0BB-DE4B-95CE-6DB70DBA9567}" type="datetimeFigureOut">
               <a:rPr lang="en-US" dirty="0"/>
               <a:pPr/>
-              <a:t>2/10/2019</a:t>
+              <a:t>2/11/2019</a:t>
             </a:fld>
             <a:endParaRPr lang="en-US" dirty="0"/>
           </a:p>
@@ -1373,7 +1388,7 @@
             <a:fld id="{B61BEF0D-F0BB-DE4B-95CE-6DB70DBA9567}" type="datetimeFigureOut">
               <a:rPr lang="en-US" dirty="0"/>
               <a:pPr/>
-              <a:t>2/10/2019</a:t>
+              <a:t>2/11/2019</a:t>
             </a:fld>
             <a:endParaRPr lang="en-US" dirty="0"/>
           </a:p>
@@ -1690,7 +1705,7 @@
             <a:fld id="{B61BEF0D-F0BB-DE4B-95CE-6DB70DBA9567}" type="datetimeFigureOut">
               <a:rPr lang="en-US" dirty="0"/>
               <a:pPr/>
-              <a:t>2/10/2019</a:t>
+              <a:t>2/11/2019</a:t>
             </a:fld>
             <a:endParaRPr lang="en-US" dirty="0"/>
           </a:p>
@@ -2083,7 +2098,7 @@
             <a:fld id="{B61BEF0D-F0BB-DE4B-95CE-6DB70DBA9567}" type="datetimeFigureOut">
               <a:rPr lang="en-US" dirty="0"/>
               <a:pPr/>
-              <a:t>2/10/2019</a:t>
+              <a:t>2/11/2019</a:t>
             </a:fld>
             <a:endParaRPr lang="en-US" dirty="0"/>
           </a:p>
@@ -2337,7 +2352,7 @@
             <a:fld id="{B61BEF0D-F0BB-DE4B-95CE-6DB70DBA9567}" type="datetimeFigureOut">
               <a:rPr lang="en-US" dirty="0"/>
               <a:pPr/>
-              <a:t>2/10/2019</a:t>
+              <a:t>2/11/2019</a:t>
             </a:fld>
             <a:endParaRPr lang="en-US" dirty="0"/>
           </a:p>
@@ -2596,7 +2611,7 @@
             <a:fld id="{B61BEF0D-F0BB-DE4B-95CE-6DB70DBA9567}" type="datetimeFigureOut">
               <a:rPr lang="en-US" dirty="0"/>
               <a:pPr/>
-              <a:t>2/10/2019</a:t>
+              <a:t>2/11/2019</a:t>
             </a:fld>
             <a:endParaRPr lang="en-US" dirty="0"/>
           </a:p>
@@ -2855,7 +2870,7 @@
             <a:fld id="{B61BEF0D-F0BB-DE4B-95CE-6DB70DBA9567}" type="datetimeFigureOut">
               <a:rPr lang="en-US" dirty="0"/>
               <a:pPr/>
-              <a:t>2/10/2019</a:t>
+              <a:t>2/11/2019</a:t>
             </a:fld>
             <a:endParaRPr lang="en-US" dirty="0"/>
           </a:p>
@@ -3181,7 +3196,7 @@
             <a:fld id="{B61BEF0D-F0BB-DE4B-95CE-6DB70DBA9567}" type="datetimeFigureOut">
               <a:rPr lang="en-US" dirty="0"/>
               <a:pPr/>
-              <a:t>2/10/2019</a:t>
+              <a:t>2/11/2019</a:t>
             </a:fld>
             <a:endParaRPr lang="en-US" dirty="0"/>
           </a:p>
@@ -3501,7 +3516,7 @@
             <a:fld id="{B61BEF0D-F0BB-DE4B-95CE-6DB70DBA9567}" type="datetimeFigureOut">
               <a:rPr lang="en-US" dirty="0"/>
               <a:pPr/>
-              <a:t>2/10/2019</a:t>
+              <a:t>2/11/2019</a:t>
             </a:fld>
             <a:endParaRPr lang="en-US" dirty="0"/>
           </a:p>
@@ -3955,7 +3970,7 @@
             <a:fld id="{B61BEF0D-F0BB-DE4B-95CE-6DB70DBA9567}" type="datetimeFigureOut">
               <a:rPr lang="en-US" dirty="0"/>
               <a:pPr/>
-              <a:t>2/10/2019</a:t>
+              <a:t>2/11/2019</a:t>
             </a:fld>
             <a:endParaRPr lang="en-US" dirty="0"/>
           </a:p>
@@ -4157,7 +4172,7 @@
             <a:fld id="{B61BEF0D-F0BB-DE4B-95CE-6DB70DBA9567}" type="datetimeFigureOut">
               <a:rPr lang="en-US" dirty="0"/>
               <a:pPr/>
-              <a:t>2/10/2019</a:t>
+              <a:t>2/11/2019</a:t>
             </a:fld>
             <a:endParaRPr lang="en-US" dirty="0"/>
           </a:p>
@@ -4331,7 +4346,7 @@
             <a:fld id="{B61BEF0D-F0BB-DE4B-95CE-6DB70DBA9567}" type="datetimeFigureOut">
               <a:rPr lang="en-US" dirty="0"/>
               <a:pPr/>
-              <a:t>2/10/2019</a:t>
+              <a:t>2/11/2019</a:t>
             </a:fld>
             <a:endParaRPr lang="en-US" dirty="0"/>
           </a:p>
@@ -4661,7 +4676,7 @@
             <a:fld id="{B61BEF0D-F0BB-DE4B-95CE-6DB70DBA9567}" type="datetimeFigureOut">
               <a:rPr lang="en-US" dirty="0"/>
               <a:pPr/>
-              <a:t>2/10/2019</a:t>
+              <a:t>2/11/2019</a:t>
             </a:fld>
             <a:endParaRPr lang="en-US" dirty="0"/>
           </a:p>
@@ -5003,7 +5018,7 @@
             <a:fld id="{B61BEF0D-F0BB-DE4B-95CE-6DB70DBA9567}" type="datetimeFigureOut">
               <a:rPr lang="en-US" dirty="0"/>
               <a:pPr/>
-              <a:t>2/10/2019</a:t>
+              <a:t>2/11/2019</a:t>
             </a:fld>
             <a:endParaRPr lang="en-US" dirty="0"/>
           </a:p>
@@ -7117,7 +7132,7 @@
             <a:fld id="{B61BEF0D-F0BB-DE4B-95CE-6DB70DBA9567}" type="datetimeFigureOut">
               <a:rPr lang="en-US" dirty="0"/>
               <a:pPr/>
-              <a:t>2/10/2019</a:t>
+              <a:t>2/11/2019</a:t>
             </a:fld>
             <a:endParaRPr lang="en-US" dirty="0"/>
           </a:p>
@@ -7923,7 +7938,7 @@
         </p:nvSpPr>
         <p:spPr>
           <a:xfrm>
-            <a:off x="1455089" y="2133600"/>
+            <a:off x="1455089" y="1905000"/>
             <a:ext cx="10049523" cy="3777622"/>
           </a:xfrm>
         </p:spPr>
@@ -7933,12 +7948,84 @@
           <a:p>
             <a:r>
               <a:rPr lang="en-US" altLang="zh-CN" dirty="0"/>
-              <a:t>Uses a 12x14 PE array, each PE has MAC and control signals. Design is fixed but can handle any input. </a:t>
+              <a:t>Uses a 12x14 PE array, each PE has MAC and control signals. Design is fixed but can handle any input.</a:t>
+            </a:r>
+          </a:p>
+          <a:p>
+            <a:r>
+              <a:rPr lang="en-US" altLang="zh-CN" dirty="0"/>
+              <a:t>Inference only chip </a:t>
+            </a:r>
+          </a:p>
+          <a:p>
+            <a:r>
+              <a:rPr lang="en-US" altLang="zh-CN" dirty="0"/>
+              <a:t>Processing element architecture </a:t>
             </a:r>
             <a:endParaRPr lang="zh-CN" altLang="en-US" dirty="0"/>
           </a:p>
         </p:txBody>
       </p:sp>
+      <p:pic>
+        <p:nvPicPr>
+          <p:cNvPr id="4" name="Picture 3">
+            <a:extLst>
+              <a:ext uri="{FF2B5EF4-FFF2-40B4-BE49-F238E27FC236}">
+                <a16:creationId xmlns:a16="http://schemas.microsoft.com/office/drawing/2014/main" id="{39A1FF47-6FAD-4714-B36A-C354EAFF89A6}"/>
+              </a:ext>
+            </a:extLst>
+          </p:cNvPr>
+          <p:cNvPicPr>
+            <a:picLocks noChangeAspect="1"/>
+          </p:cNvPicPr>
+          <p:nvPr/>
+        </p:nvPicPr>
+        <p:blipFill>
+          <a:blip r:embed="rId2"/>
+          <a:stretch>
+            <a:fillRect/>
+          </a:stretch>
+        </p:blipFill>
+        <p:spPr>
+          <a:xfrm>
+            <a:off x="570194" y="3329947"/>
+            <a:ext cx="5384237" cy="3192978"/>
+          </a:xfrm>
+          <a:prstGeom prst="rect">
+            <a:avLst/>
+          </a:prstGeom>
+        </p:spPr>
+      </p:pic>
+      <p:pic>
+        <p:nvPicPr>
+          <p:cNvPr id="5" name="Picture 4">
+            <a:extLst>
+              <a:ext uri="{FF2B5EF4-FFF2-40B4-BE49-F238E27FC236}">
+                <a16:creationId xmlns:a16="http://schemas.microsoft.com/office/drawing/2014/main" id="{518A5138-9BC1-4477-9843-7EB41E76C887}"/>
+              </a:ext>
+            </a:extLst>
+          </p:cNvPr>
+          <p:cNvPicPr>
+            <a:picLocks noChangeAspect="1"/>
+          </p:cNvPicPr>
+          <p:nvPr/>
+        </p:nvPicPr>
+        <p:blipFill>
+          <a:blip r:embed="rId3"/>
+          <a:stretch>
+            <a:fillRect/>
+          </a:stretch>
+        </p:blipFill>
+        <p:spPr>
+          <a:xfrm>
+            <a:off x="6096000" y="3424015"/>
+            <a:ext cx="5800725" cy="2809875"/>
+          </a:xfrm>
+          <a:prstGeom prst="rect">
+            <a:avLst/>
+          </a:prstGeom>
+        </p:spPr>
+      </p:pic>
     </p:spTree>
     <p:extLst>
       <p:ext uri="{BB962C8B-B14F-4D97-AF65-F5344CB8AC3E}">
@@ -7974,7 +8061,7 @@
           <p:cNvPr id="2" name="Title 1">
             <a:extLst>
               <a:ext uri="{FF2B5EF4-FFF2-40B4-BE49-F238E27FC236}">
-                <a16:creationId xmlns:a16="http://schemas.microsoft.com/office/drawing/2014/main" id="{8347EE27-451B-4924-B440-0EDACE436ADF}"/>
+                <a16:creationId xmlns:a16="http://schemas.microsoft.com/office/drawing/2014/main" id="{F0EAC019-5D9B-4433-BD12-9C108BC81292}"/>
               </a:ext>
             </a:extLst>
           </p:cNvPr>
@@ -7991,10 +8078,110 @@
           <a:lstStyle/>
           <a:p>
             <a:r>
-              <a:rPr lang="en-US" altLang="zh-CN" dirty="0"/>
-              <a:t>Questions (and potential answers)</a:t>
-            </a:r>
-            <a:endParaRPr lang="zh-CN" altLang="en-US" dirty="0"/>
+              <a:rPr lang="en-US" dirty="0" err="1"/>
+              <a:t>Eyeriss</a:t>
+            </a:r>
+            <a:r>
+              <a:rPr lang="en-US" dirty="0"/>
+              <a:t>: Processing Elements</a:t>
+            </a:r>
+            <a:endParaRPr lang="da-DK" dirty="0"/>
+          </a:p>
+        </p:txBody>
+      </p:sp>
+      <p:pic>
+        <p:nvPicPr>
+          <p:cNvPr id="5" name="Picture 4">
+            <a:extLst>
+              <a:ext uri="{FF2B5EF4-FFF2-40B4-BE49-F238E27FC236}">
+                <a16:creationId xmlns:a16="http://schemas.microsoft.com/office/drawing/2014/main" id="{3DA6D363-F80F-41C6-BC19-78490BAA392A}"/>
+              </a:ext>
+            </a:extLst>
+          </p:cNvPr>
+          <p:cNvPicPr>
+            <a:picLocks noChangeAspect="1"/>
+          </p:cNvPicPr>
+          <p:nvPr/>
+        </p:nvPicPr>
+        <p:blipFill>
+          <a:blip r:embed="rId2"/>
+          <a:stretch>
+            <a:fillRect/>
+          </a:stretch>
+        </p:blipFill>
+        <p:spPr>
+          <a:xfrm>
+            <a:off x="1047564" y="1247075"/>
+            <a:ext cx="9507521" cy="5333267"/>
+          </a:xfrm>
+          <a:prstGeom prst="rect">
+            <a:avLst/>
+          </a:prstGeom>
+        </p:spPr>
+      </p:pic>
+    </p:spTree>
+    <p:extLst>
+      <p:ext uri="{BB962C8B-B14F-4D97-AF65-F5344CB8AC3E}">
+        <p14:creationId xmlns:p14="http://schemas.microsoft.com/office/powerpoint/2010/main" val="4027596274"/>
+      </p:ext>
+    </p:extLst>
+  </p:cSld>
+  <p:clrMapOvr>
+    <a:masterClrMapping/>
+  </p:clrMapOvr>
+</p:sld>
+</file>
+
+<file path=ppt/slides/slide13.xml><?xml version="1.0" encoding="utf-8"?>
+<p:sld xmlns:a="http://schemas.openxmlformats.org/drawingml/2006/main" xmlns:r="http://schemas.openxmlformats.org/officeDocument/2006/relationships" xmlns:p="http://schemas.openxmlformats.org/presentationml/2006/main">
+  <p:cSld>
+    <p:spTree>
+      <p:nvGrpSpPr>
+        <p:cNvPr id="1" name=""/>
+        <p:cNvGrpSpPr/>
+        <p:nvPr/>
+      </p:nvGrpSpPr>
+      <p:grpSpPr>
+        <a:xfrm>
+          <a:off x="0" y="0"/>
+          <a:ext cx="0" cy="0"/>
+          <a:chOff x="0" y="0"/>
+          <a:chExt cx="0" cy="0"/>
+        </a:xfrm>
+      </p:grpSpPr>
+      <p:sp>
+        <p:nvSpPr>
+          <p:cNvPr id="2" name="Title 1">
+            <a:extLst>
+              <a:ext uri="{FF2B5EF4-FFF2-40B4-BE49-F238E27FC236}">
+                <a16:creationId xmlns:a16="http://schemas.microsoft.com/office/drawing/2014/main" id="{5FF374AE-6C56-4D40-B2EC-89AB7BC62DEE}"/>
+              </a:ext>
+            </a:extLst>
+          </p:cNvPr>
+          <p:cNvSpPr>
+            <a:spLocks noGrp="1"/>
+          </p:cNvSpPr>
+          <p:nvPr>
+            <p:ph type="title"/>
+          </p:nvPr>
+        </p:nvSpPr>
+        <p:spPr>
+          <a:xfrm>
+            <a:off x="1677881" y="399949"/>
+            <a:ext cx="9835610" cy="1280890"/>
+          </a:xfrm>
+        </p:spPr>
+        <p:txBody>
+          <a:bodyPr>
+            <a:normAutofit fontScale="90000"/>
+          </a:bodyPr>
+          <a:lstStyle/>
+          <a:p>
+            <a:r>
+              <a:rPr lang="en-US" dirty="0"/>
+              <a:t>TABLA : A Unified Template-based Framework for Accelerating Statistical Machine Learning</a:t>
+            </a:r>
+            <a:endParaRPr lang="da-DK" dirty="0"/>
           </a:p>
         </p:txBody>
       </p:sp>
@@ -8003,7 +8190,7 @@
           <p:cNvPr id="3" name="Content Placeholder 2">
             <a:extLst>
               <a:ext uri="{FF2B5EF4-FFF2-40B4-BE49-F238E27FC236}">
-                <a16:creationId xmlns:a16="http://schemas.microsoft.com/office/drawing/2014/main" id="{247D4736-6C18-4580-BE29-751BA4EBA23B}"/>
+                <a16:creationId xmlns:a16="http://schemas.microsoft.com/office/drawing/2014/main" id="{EF7599EC-3EF2-4544-8D8F-6986732B951E}"/>
               </a:ext>
             </a:extLst>
           </p:cNvPr>
@@ -8016,105 +8203,1131 @@
         </p:nvSpPr>
         <p:spPr>
           <a:xfrm>
-            <a:off x="2589212" y="1709530"/>
-            <a:ext cx="8915400" cy="4802588"/>
+            <a:off x="778699" y="1540189"/>
+            <a:ext cx="11126255" cy="3777622"/>
           </a:xfrm>
         </p:spPr>
         <p:txBody>
           <a:bodyPr>
-            <a:normAutofit fontScale="92500" lnSpcReduction="10000"/>
+            <a:normAutofit/>
           </a:bodyPr>
           <a:lstStyle/>
           <a:p>
             <a:r>
-              <a:rPr lang="en-US" altLang="zh-CN" dirty="0"/>
-              <a:t>Application: 		Inference, or both inference and training?</a:t>
-            </a:r>
-          </a:p>
-          <a:p>
-            <a:pPr lvl="1"/>
-            <a:r>
-              <a:rPr lang="en-US" altLang="zh-CN" dirty="0"/>
-              <a:t>I would like to try both inference and training</a:t>
-            </a:r>
-          </a:p>
-          <a:p>
-            <a:r>
-              <a:rPr lang="en-US" altLang="zh-CN" dirty="0"/>
-              <a:t>Precision: 		Floating point, dynamic fixed point, static fixed point?</a:t>
-            </a:r>
-          </a:p>
-          <a:p>
-            <a:pPr lvl="1"/>
-            <a:r>
-              <a:rPr lang="en-US" altLang="zh-CN" dirty="0"/>
-              <a:t>Static fixed point for now</a:t>
-            </a:r>
-          </a:p>
-          <a:p>
-            <a:r>
-              <a:rPr lang="en-US" altLang="zh-CN" dirty="0"/>
-              <a:t>Architecture: 	MAC PE’s, Modular PE’s, Modular-generated?</a:t>
-            </a:r>
-          </a:p>
-          <a:p>
-            <a:pPr lvl="1"/>
-            <a:r>
-              <a:rPr lang="en-US" altLang="zh-CN" dirty="0"/>
-              <a:t>Up for discussion. Perhaps a modular PE or modular generated would be easier.</a:t>
-            </a:r>
-          </a:p>
-          <a:p>
-            <a:r>
-              <a:rPr lang="en-US" altLang="zh-CN" dirty="0"/>
-              <a:t>Network to train: 	</a:t>
-            </a:r>
-            <a:r>
-              <a:rPr lang="en-US" altLang="zh-CN" dirty="0" err="1"/>
-              <a:t>LeNet</a:t>
-            </a:r>
-            <a:r>
-              <a:rPr lang="en-US" altLang="zh-CN" dirty="0"/>
-              <a:t>? CIFAR? ImageNet? </a:t>
-            </a:r>
-          </a:p>
-          <a:p>
-            <a:pPr lvl="1"/>
-            <a:r>
-              <a:rPr lang="en-US" altLang="zh-CN" dirty="0" err="1"/>
-              <a:t>LeNet</a:t>
-            </a:r>
-            <a:r>
-              <a:rPr lang="en-US" altLang="zh-CN" dirty="0"/>
-              <a:t> is quite easy to achieve high accuracy, might not give a good reflection of the effect of reduced precision from FP. ImageNet is a massive scale set. CIFAR is a medium size dataset and the images are relatively non-massive. Therefore, I suggest CIFAR as the dataset to train a network on</a:t>
-            </a:r>
-          </a:p>
-          <a:p>
-            <a:r>
-              <a:rPr lang="en-US" altLang="zh-CN" dirty="0"/>
-              <a:t>Comparison:		How to build CPU- and GPU-based models?</a:t>
-            </a:r>
-          </a:p>
-          <a:p>
-            <a:pPr lvl="1"/>
-            <a:r>
-              <a:rPr lang="en-US" altLang="zh-CN" dirty="0"/>
-              <a:t>TensorFlow</a:t>
-            </a:r>
-          </a:p>
-          <a:p>
-            <a:r>
-              <a:rPr lang="en-US" altLang="zh-CN" dirty="0"/>
-              <a:t>Need: DRAM to store training data. SoC, ideally with a nice chunk of memory to store weights and partial results to minimize DRAM accesses</a:t>
-            </a:r>
-            <a:endParaRPr lang="zh-CN" altLang="en-US" dirty="0"/>
-          </a:p>
-        </p:txBody>
-      </p:sp>
+              <a:rPr lang="en-US" dirty="0"/>
+              <a:t>TABLA is not a chip or FPGA prototype but a framework to allow for easy usage and implementation of machine learning systems</a:t>
+            </a:r>
+          </a:p>
+          <a:p>
+            <a:r>
+              <a:rPr lang="en-US" dirty="0"/>
+              <a:t>Has support for both inference and learning for any FPGA</a:t>
+            </a:r>
+          </a:p>
+          <a:p>
+            <a:r>
+              <a:rPr lang="en-US" dirty="0"/>
+              <a:t>Code regenerated on network change but overall architecture is similar to </a:t>
+            </a:r>
+            <a:r>
+              <a:rPr lang="en-US" dirty="0" err="1"/>
+              <a:t>Eyeriss</a:t>
+            </a:r>
+            <a:endParaRPr lang="en-US" dirty="0"/>
+          </a:p>
+          <a:p>
+            <a:r>
+              <a:rPr lang="en-US" dirty="0"/>
+              <a:t>“These templates, designed by expert hardware designers, are in synthesizable Verilog format. The design builder generates the accelerator and its interfacing logic using these accelerator templates. Specifically, the final output of the design builder is a set of synthesizable Verilog code. Internally, it uses a predesigned Verilog template, along with the programmer-specified gradient function and a high level specification of target FPGA platform.”</a:t>
+            </a:r>
+          </a:p>
+        </p:txBody>
+      </p:sp>
+      <p:pic>
+        <p:nvPicPr>
+          <p:cNvPr id="4" name="Picture 3">
+            <a:extLst>
+              <a:ext uri="{FF2B5EF4-FFF2-40B4-BE49-F238E27FC236}">
+                <a16:creationId xmlns:a16="http://schemas.microsoft.com/office/drawing/2014/main" id="{ED7B5BB7-3884-4521-8CF9-4D24D555FA6B}"/>
+              </a:ext>
+            </a:extLst>
+          </p:cNvPr>
+          <p:cNvPicPr>
+            <a:picLocks noChangeAspect="1"/>
+          </p:cNvPicPr>
+          <p:nvPr/>
+        </p:nvPicPr>
+        <p:blipFill>
+          <a:blip r:embed="rId2"/>
+          <a:stretch>
+            <a:fillRect/>
+          </a:stretch>
+        </p:blipFill>
+        <p:spPr>
+          <a:xfrm>
+            <a:off x="303504" y="4505325"/>
+            <a:ext cx="11601450" cy="2352675"/>
+          </a:xfrm>
+          <a:prstGeom prst="rect">
+            <a:avLst/>
+          </a:prstGeom>
+        </p:spPr>
+      </p:pic>
     </p:spTree>
     <p:extLst>
       <p:ext uri="{BB962C8B-B14F-4D97-AF65-F5344CB8AC3E}">
-        <p14:creationId xmlns:p14="http://schemas.microsoft.com/office/powerpoint/2010/main" val="145792680"/>
+        <p14:creationId xmlns:p14="http://schemas.microsoft.com/office/powerpoint/2010/main" val="3305540116"/>
+      </p:ext>
+    </p:extLst>
+  </p:cSld>
+  <p:clrMapOvr>
+    <a:masterClrMapping/>
+  </p:clrMapOvr>
+</p:sld>
+</file>
+
+<file path=ppt/slides/slide14.xml><?xml version="1.0" encoding="utf-8"?>
+<p:sld xmlns:a="http://schemas.openxmlformats.org/drawingml/2006/main" xmlns:r="http://schemas.openxmlformats.org/officeDocument/2006/relationships" xmlns:p="http://schemas.openxmlformats.org/presentationml/2006/main">
+  <p:cSld>
+    <p:spTree>
+      <p:nvGrpSpPr>
+        <p:cNvPr id="1" name=""/>
+        <p:cNvGrpSpPr/>
+        <p:nvPr/>
+      </p:nvGrpSpPr>
+      <p:grpSpPr>
+        <a:xfrm>
+          <a:off x="0" y="0"/>
+          <a:ext cx="0" cy="0"/>
+          <a:chOff x="0" y="0"/>
+          <a:chExt cx="0" cy="0"/>
+        </a:xfrm>
+      </p:grpSpPr>
+      <p:sp>
+        <p:nvSpPr>
+          <p:cNvPr id="2" name="Title 1">
+            <a:extLst>
+              <a:ext uri="{FF2B5EF4-FFF2-40B4-BE49-F238E27FC236}">
+                <a16:creationId xmlns:a16="http://schemas.microsoft.com/office/drawing/2014/main" id="{6AFAD548-71A3-49B1-83FA-014C2F8BA643}"/>
+              </a:ext>
+            </a:extLst>
+          </p:cNvPr>
+          <p:cNvSpPr>
+            <a:spLocks noGrp="1"/>
+          </p:cNvSpPr>
+          <p:nvPr>
+            <p:ph type="title"/>
+          </p:nvPr>
+        </p:nvSpPr>
+        <p:spPr>
+          <a:xfrm>
+            <a:off x="1518083" y="624110"/>
+            <a:ext cx="9986530" cy="1280890"/>
+          </a:xfrm>
+        </p:spPr>
+        <p:txBody>
+          <a:bodyPr/>
+          <a:lstStyle/>
+          <a:p>
+            <a:r>
+              <a:rPr lang="en-US" dirty="0" err="1"/>
+              <a:t>Tabla</a:t>
+            </a:r>
+            <a:r>
+              <a:rPr lang="en-US" dirty="0"/>
+              <a:t>: Basis of the Generated Architecture</a:t>
+            </a:r>
+            <a:endParaRPr lang="da-DK" dirty="0"/>
+          </a:p>
+        </p:txBody>
+      </p:sp>
+      <p:pic>
+        <p:nvPicPr>
+          <p:cNvPr id="4" name="Picture 3">
+            <a:extLst>
+              <a:ext uri="{FF2B5EF4-FFF2-40B4-BE49-F238E27FC236}">
+                <a16:creationId xmlns:a16="http://schemas.microsoft.com/office/drawing/2014/main" id="{7442CCDF-F59C-4E17-A778-CA26494CEFEA}"/>
+              </a:ext>
+            </a:extLst>
+          </p:cNvPr>
+          <p:cNvPicPr>
+            <a:picLocks noChangeAspect="1"/>
+          </p:cNvPicPr>
+          <p:nvPr/>
+        </p:nvPicPr>
+        <p:blipFill>
+          <a:blip r:embed="rId2"/>
+          <a:stretch>
+            <a:fillRect/>
+          </a:stretch>
+        </p:blipFill>
+        <p:spPr>
+          <a:xfrm>
+            <a:off x="239096" y="2041863"/>
+            <a:ext cx="6400538" cy="4258457"/>
+          </a:xfrm>
+          <a:prstGeom prst="rect">
+            <a:avLst/>
+          </a:prstGeom>
+        </p:spPr>
+      </p:pic>
+      <p:pic>
+        <p:nvPicPr>
+          <p:cNvPr id="5" name="Picture 4">
+            <a:extLst>
+              <a:ext uri="{FF2B5EF4-FFF2-40B4-BE49-F238E27FC236}">
+                <a16:creationId xmlns:a16="http://schemas.microsoft.com/office/drawing/2014/main" id="{68E9A605-D907-4CC4-AED8-3194BA8130A0}"/>
+              </a:ext>
+            </a:extLst>
+          </p:cNvPr>
+          <p:cNvPicPr>
+            <a:picLocks noChangeAspect="1"/>
+          </p:cNvPicPr>
+          <p:nvPr/>
+        </p:nvPicPr>
+        <p:blipFill>
+          <a:blip r:embed="rId3"/>
+          <a:stretch>
+            <a:fillRect/>
+          </a:stretch>
+        </p:blipFill>
+        <p:spPr>
+          <a:xfrm>
+            <a:off x="6739687" y="1646020"/>
+            <a:ext cx="5381291" cy="4948792"/>
+          </a:xfrm>
+          <a:prstGeom prst="rect">
+            <a:avLst/>
+          </a:prstGeom>
+        </p:spPr>
+      </p:pic>
+    </p:spTree>
+    <p:extLst>
+      <p:ext uri="{BB962C8B-B14F-4D97-AF65-F5344CB8AC3E}">
+        <p14:creationId xmlns:p14="http://schemas.microsoft.com/office/powerpoint/2010/main" val="803490459"/>
+      </p:ext>
+    </p:extLst>
+  </p:cSld>
+  <p:clrMapOvr>
+    <a:masterClrMapping/>
+  </p:clrMapOvr>
+</p:sld>
+</file>
+
+<file path=ppt/slides/slide15.xml><?xml version="1.0" encoding="utf-8"?>
+<p:sld xmlns:a="http://schemas.openxmlformats.org/drawingml/2006/main" xmlns:r="http://schemas.openxmlformats.org/officeDocument/2006/relationships" xmlns:p="http://schemas.openxmlformats.org/presentationml/2006/main">
+  <p:cSld>
+    <p:spTree>
+      <p:nvGrpSpPr>
+        <p:cNvPr id="1" name=""/>
+        <p:cNvGrpSpPr/>
+        <p:nvPr/>
+      </p:nvGrpSpPr>
+      <p:grpSpPr>
+        <a:xfrm>
+          <a:off x="0" y="0"/>
+          <a:ext cx="0" cy="0"/>
+          <a:chOff x="0" y="0"/>
+          <a:chExt cx="0" cy="0"/>
+        </a:xfrm>
+      </p:grpSpPr>
+      <p:sp>
+        <p:nvSpPr>
+          <p:cNvPr id="2" name="Title 1">
+            <a:extLst>
+              <a:ext uri="{FF2B5EF4-FFF2-40B4-BE49-F238E27FC236}">
+                <a16:creationId xmlns:a16="http://schemas.microsoft.com/office/drawing/2014/main" id="{F6E3FBF4-915D-40E4-B87B-194AEC7164C0}"/>
+              </a:ext>
+            </a:extLst>
+          </p:cNvPr>
+          <p:cNvSpPr>
+            <a:spLocks noGrp="1"/>
+          </p:cNvSpPr>
+          <p:nvPr>
+            <p:ph type="title"/>
+          </p:nvPr>
+        </p:nvSpPr>
+        <p:spPr>
+          <a:xfrm>
+            <a:off x="1640155" y="411046"/>
+            <a:ext cx="8911687" cy="1280890"/>
+          </a:xfrm>
+        </p:spPr>
+        <p:txBody>
+          <a:bodyPr/>
+          <a:lstStyle/>
+          <a:p>
+            <a:r>
+              <a:rPr lang="en-US" dirty="0"/>
+              <a:t>F-CNN</a:t>
+            </a:r>
+            <a:endParaRPr lang="da-DK" dirty="0"/>
+          </a:p>
+        </p:txBody>
+      </p:sp>
+      <p:sp>
+        <p:nvSpPr>
+          <p:cNvPr id="3" name="Content Placeholder 2">
+            <a:extLst>
+              <a:ext uri="{FF2B5EF4-FFF2-40B4-BE49-F238E27FC236}">
+                <a16:creationId xmlns:a16="http://schemas.microsoft.com/office/drawing/2014/main" id="{E49A6320-D057-476F-A8D6-FDB80027DEE2}"/>
+              </a:ext>
+            </a:extLst>
+          </p:cNvPr>
+          <p:cNvSpPr>
+            <a:spLocks noGrp="1"/>
+          </p:cNvSpPr>
+          <p:nvPr>
+            <p:ph idx="1"/>
+          </p:nvPr>
+        </p:nvSpPr>
+        <p:spPr>
+          <a:xfrm>
+            <a:off x="1222583" y="1264555"/>
+            <a:ext cx="9746833" cy="2755777"/>
+          </a:xfrm>
+        </p:spPr>
+        <p:txBody>
+          <a:bodyPr>
+            <a:normAutofit/>
+          </a:bodyPr>
+          <a:lstStyle/>
+          <a:p>
+            <a:r>
+              <a:rPr lang="en-US" dirty="0"/>
+              <a:t>Full-functional FPGA based model, uses modular layers design, has three types of modules: convolutional, pooling, and fully connected. Firmware for FPGA must be regenerated on a network architecture change</a:t>
+            </a:r>
+          </a:p>
+          <a:p>
+            <a:r>
+              <a:rPr lang="da-DK" dirty="0" err="1"/>
+              <a:t>Uses</a:t>
+            </a:r>
+            <a:r>
+              <a:rPr lang="da-DK" dirty="0"/>
+              <a:t> Altera </a:t>
+            </a:r>
+            <a:r>
+              <a:rPr lang="da-DK" dirty="0" err="1"/>
+              <a:t>Maxelor</a:t>
+            </a:r>
+            <a:r>
+              <a:rPr lang="da-DK" dirty="0"/>
+              <a:t> and </a:t>
+            </a:r>
+            <a:r>
+              <a:rPr lang="da-DK" dirty="0" err="1"/>
+              <a:t>floating</a:t>
+            </a:r>
+            <a:r>
+              <a:rPr lang="da-DK" dirty="0"/>
+              <a:t> point </a:t>
+            </a:r>
+            <a:r>
+              <a:rPr lang="da-DK" dirty="0" err="1"/>
+              <a:t>precision</a:t>
+            </a:r>
+            <a:endParaRPr lang="da-DK" dirty="0"/>
+          </a:p>
+          <a:p>
+            <a:r>
+              <a:rPr lang="da-DK" dirty="0"/>
+              <a:t>4x faster </a:t>
+            </a:r>
+            <a:r>
+              <a:rPr lang="da-DK" dirty="0" err="1"/>
+              <a:t>than</a:t>
+            </a:r>
+            <a:r>
+              <a:rPr lang="da-DK" dirty="0"/>
+              <a:t> </a:t>
+            </a:r>
+            <a:r>
+              <a:rPr lang="da-DK" dirty="0" err="1"/>
+              <a:t>their</a:t>
+            </a:r>
+            <a:r>
+              <a:rPr lang="da-DK" dirty="0"/>
+              <a:t> CPU model, 7.5x more </a:t>
+            </a:r>
+            <a:r>
+              <a:rPr lang="da-DK" dirty="0" err="1"/>
+              <a:t>energy</a:t>
+            </a:r>
+            <a:r>
+              <a:rPr lang="da-DK" dirty="0"/>
+              <a:t> efficient </a:t>
+            </a:r>
+            <a:r>
+              <a:rPr lang="da-DK" dirty="0" err="1"/>
+              <a:t>than</a:t>
+            </a:r>
+            <a:r>
+              <a:rPr lang="da-DK" dirty="0"/>
+              <a:t> </a:t>
+            </a:r>
+            <a:r>
+              <a:rPr lang="da-DK" dirty="0" err="1"/>
+              <a:t>their</a:t>
+            </a:r>
+            <a:r>
+              <a:rPr lang="da-DK" dirty="0"/>
+              <a:t> GPU model</a:t>
+            </a:r>
+          </a:p>
+          <a:p>
+            <a:r>
+              <a:rPr lang="da-DK" dirty="0" err="1"/>
+              <a:t>Weights</a:t>
+            </a:r>
+            <a:r>
+              <a:rPr lang="da-DK" dirty="0"/>
+              <a:t> and </a:t>
+            </a:r>
+            <a:r>
+              <a:rPr lang="da-DK" dirty="0" err="1"/>
+              <a:t>baises</a:t>
+            </a:r>
+            <a:r>
+              <a:rPr lang="da-DK" dirty="0"/>
+              <a:t> </a:t>
+            </a:r>
+            <a:r>
+              <a:rPr lang="da-DK" dirty="0" err="1"/>
+              <a:t>stored</a:t>
+            </a:r>
+            <a:r>
+              <a:rPr lang="da-DK" dirty="0"/>
+              <a:t> in CPU, </a:t>
+            </a:r>
+            <a:r>
+              <a:rPr lang="da-DK" dirty="0" err="1"/>
+              <a:t>training</a:t>
+            </a:r>
+            <a:r>
+              <a:rPr lang="da-DK" dirty="0"/>
+              <a:t> data in DRAM</a:t>
+            </a:r>
+          </a:p>
+          <a:p>
+            <a:r>
+              <a:rPr lang="da-DK" dirty="0"/>
+              <a:t>Did not </a:t>
+            </a:r>
+            <a:r>
+              <a:rPr lang="da-DK" dirty="0" err="1"/>
+              <a:t>appear</a:t>
+            </a:r>
+            <a:r>
+              <a:rPr lang="da-DK" dirty="0"/>
+              <a:t> to </a:t>
+            </a:r>
+            <a:r>
+              <a:rPr lang="da-DK" dirty="0" err="1"/>
+              <a:t>use</a:t>
+            </a:r>
+            <a:r>
+              <a:rPr lang="da-DK" dirty="0"/>
+              <a:t> </a:t>
+            </a:r>
+            <a:r>
+              <a:rPr lang="da-DK" dirty="0" err="1"/>
+              <a:t>much</a:t>
+            </a:r>
+            <a:r>
+              <a:rPr lang="da-DK" dirty="0"/>
+              <a:t> data </a:t>
+            </a:r>
+            <a:r>
+              <a:rPr lang="da-DK" dirty="0" err="1"/>
+              <a:t>reuse</a:t>
+            </a:r>
+            <a:r>
+              <a:rPr lang="da-DK" dirty="0"/>
+              <a:t>, potential for </a:t>
+            </a:r>
+            <a:r>
+              <a:rPr lang="da-DK" dirty="0" err="1"/>
+              <a:t>expansion</a:t>
+            </a:r>
+            <a:endParaRPr lang="da-DK" dirty="0"/>
+          </a:p>
+        </p:txBody>
+      </p:sp>
+      <p:pic>
+        <p:nvPicPr>
+          <p:cNvPr id="4" name="Picture 3">
+            <a:extLst>
+              <a:ext uri="{FF2B5EF4-FFF2-40B4-BE49-F238E27FC236}">
+                <a16:creationId xmlns:a16="http://schemas.microsoft.com/office/drawing/2014/main" id="{CAF9710A-7216-4B12-B365-B8B5CD2DE49A}"/>
+              </a:ext>
+            </a:extLst>
+          </p:cNvPr>
+          <p:cNvPicPr>
+            <a:picLocks noChangeAspect="1"/>
+          </p:cNvPicPr>
+          <p:nvPr/>
+        </p:nvPicPr>
+        <p:blipFill>
+          <a:blip r:embed="rId2"/>
+          <a:stretch>
+            <a:fillRect/>
+          </a:stretch>
+        </p:blipFill>
+        <p:spPr>
+          <a:xfrm>
+            <a:off x="3559945" y="3915052"/>
+            <a:ext cx="4843069" cy="2942948"/>
+          </a:xfrm>
+          <a:prstGeom prst="rect">
+            <a:avLst/>
+          </a:prstGeom>
+        </p:spPr>
+      </p:pic>
+    </p:spTree>
+    <p:extLst>
+      <p:ext uri="{BB962C8B-B14F-4D97-AF65-F5344CB8AC3E}">
+        <p14:creationId xmlns:p14="http://schemas.microsoft.com/office/powerpoint/2010/main" val="2913069912"/>
+      </p:ext>
+    </p:extLst>
+  </p:cSld>
+  <p:clrMapOvr>
+    <a:masterClrMapping/>
+  </p:clrMapOvr>
+</p:sld>
+</file>
+
+<file path=ppt/slides/slide16.xml><?xml version="1.0" encoding="utf-8"?>
+<p:sld xmlns:a="http://schemas.openxmlformats.org/drawingml/2006/main" xmlns:r="http://schemas.openxmlformats.org/officeDocument/2006/relationships" xmlns:p="http://schemas.openxmlformats.org/presentationml/2006/main">
+  <p:cSld>
+    <p:spTree>
+      <p:nvGrpSpPr>
+        <p:cNvPr id="1" name=""/>
+        <p:cNvGrpSpPr/>
+        <p:nvPr/>
+      </p:nvGrpSpPr>
+      <p:grpSpPr>
+        <a:xfrm>
+          <a:off x="0" y="0"/>
+          <a:ext cx="0" cy="0"/>
+          <a:chOff x="0" y="0"/>
+          <a:chExt cx="0" cy="0"/>
+        </a:xfrm>
+      </p:grpSpPr>
+      <p:sp>
+        <p:nvSpPr>
+          <p:cNvPr id="2" name="Title 1">
+            <a:extLst>
+              <a:ext uri="{FF2B5EF4-FFF2-40B4-BE49-F238E27FC236}">
+                <a16:creationId xmlns:a16="http://schemas.microsoft.com/office/drawing/2014/main" id="{F9014817-9A9A-4C6A-B385-FBD95BDB7A56}"/>
+              </a:ext>
+            </a:extLst>
+          </p:cNvPr>
+          <p:cNvSpPr>
+            <a:spLocks noGrp="1"/>
+          </p:cNvSpPr>
+          <p:nvPr>
+            <p:ph type="title"/>
+          </p:nvPr>
+        </p:nvSpPr>
+        <p:spPr/>
+        <p:txBody>
+          <a:bodyPr/>
+          <a:lstStyle/>
+          <a:p>
+            <a:r>
+              <a:rPr lang="en-US" dirty="0"/>
+              <a:t>F-CNN: Modular based architecture</a:t>
+            </a:r>
+            <a:endParaRPr lang="da-DK" dirty="0"/>
+          </a:p>
+        </p:txBody>
+      </p:sp>
+      <p:pic>
+        <p:nvPicPr>
+          <p:cNvPr id="4" name="Picture 3">
+            <a:extLst>
+              <a:ext uri="{FF2B5EF4-FFF2-40B4-BE49-F238E27FC236}">
+                <a16:creationId xmlns:a16="http://schemas.microsoft.com/office/drawing/2014/main" id="{6F4822B0-CA3A-4139-9A85-7DD994408BED}"/>
+              </a:ext>
+            </a:extLst>
+          </p:cNvPr>
+          <p:cNvPicPr>
+            <a:picLocks noChangeAspect="1"/>
+          </p:cNvPicPr>
+          <p:nvPr/>
+        </p:nvPicPr>
+        <p:blipFill>
+          <a:blip r:embed="rId2"/>
+          <a:stretch>
+            <a:fillRect/>
+          </a:stretch>
+        </p:blipFill>
+        <p:spPr>
+          <a:xfrm>
+            <a:off x="559150" y="1402671"/>
+            <a:ext cx="4975337" cy="5313285"/>
+          </a:xfrm>
+          <a:prstGeom prst="rect">
+            <a:avLst/>
+          </a:prstGeom>
+        </p:spPr>
+      </p:pic>
+      <p:pic>
+        <p:nvPicPr>
+          <p:cNvPr id="5" name="Picture 4">
+            <a:extLst>
+              <a:ext uri="{FF2B5EF4-FFF2-40B4-BE49-F238E27FC236}">
+                <a16:creationId xmlns:a16="http://schemas.microsoft.com/office/drawing/2014/main" id="{810197D5-A5A7-4B97-9506-5BAA433413CE}"/>
+              </a:ext>
+            </a:extLst>
+          </p:cNvPr>
+          <p:cNvPicPr>
+            <a:picLocks noChangeAspect="1"/>
+          </p:cNvPicPr>
+          <p:nvPr/>
+        </p:nvPicPr>
+        <p:blipFill>
+          <a:blip r:embed="rId3"/>
+          <a:stretch>
+            <a:fillRect/>
+          </a:stretch>
+        </p:blipFill>
+        <p:spPr>
+          <a:xfrm>
+            <a:off x="5841268" y="2565647"/>
+            <a:ext cx="5791582" cy="3389072"/>
+          </a:xfrm>
+          <a:prstGeom prst="rect">
+            <a:avLst/>
+          </a:prstGeom>
+        </p:spPr>
+      </p:pic>
+    </p:spTree>
+    <p:extLst>
+      <p:ext uri="{BB962C8B-B14F-4D97-AF65-F5344CB8AC3E}">
+        <p14:creationId xmlns:p14="http://schemas.microsoft.com/office/powerpoint/2010/main" val="2343372868"/>
+      </p:ext>
+    </p:extLst>
+  </p:cSld>
+  <p:clrMapOvr>
+    <a:masterClrMapping/>
+  </p:clrMapOvr>
+</p:sld>
+</file>
+
+<file path=ppt/slides/slide17.xml><?xml version="1.0" encoding="utf-8"?>
+<p:sld xmlns:a="http://schemas.openxmlformats.org/drawingml/2006/main" xmlns:r="http://schemas.openxmlformats.org/officeDocument/2006/relationships" xmlns:p="http://schemas.openxmlformats.org/presentationml/2006/main">
+  <p:cSld>
+    <p:spTree>
+      <p:nvGrpSpPr>
+        <p:cNvPr id="1" name=""/>
+        <p:cNvGrpSpPr/>
+        <p:nvPr/>
+      </p:nvGrpSpPr>
+      <p:grpSpPr>
+        <a:xfrm>
+          <a:off x="0" y="0"/>
+          <a:ext cx="0" cy="0"/>
+          <a:chOff x="0" y="0"/>
+          <a:chExt cx="0" cy="0"/>
+        </a:xfrm>
+      </p:grpSpPr>
+      <p:sp>
+        <p:nvSpPr>
+          <p:cNvPr id="2" name="Title 1">
+            <a:extLst>
+              <a:ext uri="{FF2B5EF4-FFF2-40B4-BE49-F238E27FC236}">
+                <a16:creationId xmlns:a16="http://schemas.microsoft.com/office/drawing/2014/main" id="{EADCEAF0-6EF0-4C53-B70C-4CFD1BC9BF53}"/>
+              </a:ext>
+            </a:extLst>
+          </p:cNvPr>
+          <p:cNvSpPr>
+            <a:spLocks noGrp="1"/>
+          </p:cNvSpPr>
+          <p:nvPr>
+            <p:ph type="title"/>
+          </p:nvPr>
+        </p:nvSpPr>
+        <p:spPr>
+          <a:xfrm>
+            <a:off x="2352583" y="624110"/>
+            <a:ext cx="9152029" cy="1280890"/>
+          </a:xfrm>
+        </p:spPr>
+        <p:txBody>
+          <a:bodyPr/>
+          <a:lstStyle/>
+          <a:p>
+            <a:r>
+              <a:rPr lang="en-US" dirty="0" err="1"/>
+              <a:t>nn</a:t>
+            </a:r>
+            <a:r>
+              <a:rPr lang="en-US" dirty="0"/>
+              <a:t>-X: A 240G-ops/s Mobile Coprocessor for Deep Neural Networks</a:t>
+            </a:r>
+            <a:endParaRPr lang="da-DK" dirty="0"/>
+          </a:p>
+        </p:txBody>
+      </p:sp>
+      <p:sp>
+        <p:nvSpPr>
+          <p:cNvPr id="3" name="Content Placeholder 2">
+            <a:extLst>
+              <a:ext uri="{FF2B5EF4-FFF2-40B4-BE49-F238E27FC236}">
+                <a16:creationId xmlns:a16="http://schemas.microsoft.com/office/drawing/2014/main" id="{1F9228BD-A178-4991-8E75-02065AB73A15}"/>
+              </a:ext>
+            </a:extLst>
+          </p:cNvPr>
+          <p:cNvSpPr>
+            <a:spLocks noGrp="1"/>
+          </p:cNvSpPr>
+          <p:nvPr>
+            <p:ph idx="1"/>
+          </p:nvPr>
+        </p:nvSpPr>
+        <p:spPr>
+          <a:xfrm>
+            <a:off x="2352583" y="2133600"/>
+            <a:ext cx="9152029" cy="3777622"/>
+          </a:xfrm>
+        </p:spPr>
+        <p:txBody>
+          <a:bodyPr/>
+          <a:lstStyle/>
+          <a:p>
+            <a:r>
+              <a:rPr lang="en-US" dirty="0"/>
+              <a:t>Performs inference only, designed to handle and accelerate the heavy computational workload of a DNN on mobile devices</a:t>
+            </a:r>
+          </a:p>
+          <a:p>
+            <a:r>
+              <a:rPr lang="en-US" dirty="0"/>
+              <a:t>Implemented on Xilinx Zynq SoC</a:t>
+            </a:r>
+          </a:p>
+          <a:p>
+            <a:r>
+              <a:rPr lang="da-DK" dirty="0"/>
+              <a:t>Has </a:t>
+            </a:r>
+            <a:r>
+              <a:rPr lang="da-DK" dirty="0" err="1"/>
+              <a:t>something</a:t>
+            </a:r>
+            <a:r>
+              <a:rPr lang="da-DK" dirty="0"/>
+              <a:t> </a:t>
+            </a:r>
+            <a:r>
+              <a:rPr lang="da-DK" dirty="0" err="1"/>
+              <a:t>similar</a:t>
+            </a:r>
+            <a:r>
+              <a:rPr lang="da-DK" dirty="0"/>
+              <a:t> to </a:t>
+            </a:r>
+            <a:r>
+              <a:rPr lang="da-DK" dirty="0" err="1"/>
+              <a:t>processing</a:t>
+            </a:r>
+            <a:r>
+              <a:rPr lang="da-DK" dirty="0"/>
+              <a:t> elements but </a:t>
+            </a:r>
+            <a:r>
+              <a:rPr lang="da-DK" dirty="0" err="1"/>
+              <a:t>are</a:t>
+            </a:r>
+            <a:r>
+              <a:rPr lang="da-DK" dirty="0"/>
+              <a:t> </a:t>
+            </a:r>
+            <a:r>
+              <a:rPr lang="da-DK" dirty="0" err="1"/>
+              <a:t>called</a:t>
+            </a:r>
+            <a:r>
+              <a:rPr lang="da-DK" dirty="0"/>
+              <a:t> ”Collections”</a:t>
+            </a:r>
+          </a:p>
+          <a:p>
+            <a:r>
+              <a:rPr lang="da-DK" dirty="0" err="1"/>
+              <a:t>Each</a:t>
+            </a:r>
+            <a:r>
+              <a:rPr lang="da-DK" dirty="0"/>
+              <a:t> </a:t>
+            </a:r>
+            <a:r>
+              <a:rPr lang="en-US" dirty="0"/>
+              <a:t>collection</a:t>
+            </a:r>
+            <a:r>
+              <a:rPr lang="da-DK" dirty="0"/>
+              <a:t> </a:t>
+            </a:r>
+            <a:r>
+              <a:rPr lang="da-DK" dirty="0" err="1"/>
+              <a:t>contains</a:t>
+            </a:r>
+            <a:r>
+              <a:rPr lang="da-DK" dirty="0"/>
+              <a:t> </a:t>
+            </a:r>
+            <a:r>
+              <a:rPr lang="da-DK" dirty="0" err="1"/>
+              <a:t>several</a:t>
+            </a:r>
+            <a:r>
+              <a:rPr lang="da-DK" dirty="0"/>
+              <a:t> </a:t>
+            </a:r>
+            <a:r>
+              <a:rPr lang="da-DK" dirty="0" err="1"/>
+              <a:t>functional</a:t>
+            </a:r>
+            <a:r>
+              <a:rPr lang="da-DK" dirty="0"/>
+              <a:t> </a:t>
+            </a:r>
+            <a:r>
+              <a:rPr lang="da-DK" dirty="0" err="1"/>
+              <a:t>modules</a:t>
+            </a:r>
+            <a:r>
+              <a:rPr lang="da-DK" dirty="0"/>
+              <a:t>: </a:t>
+            </a:r>
+            <a:r>
+              <a:rPr lang="da-DK" dirty="0" err="1"/>
+              <a:t>convolutional</a:t>
+            </a:r>
+            <a:r>
+              <a:rPr lang="da-DK" dirty="0"/>
+              <a:t>, </a:t>
+            </a:r>
+            <a:r>
+              <a:rPr lang="da-DK" dirty="0" err="1"/>
+              <a:t>pooling</a:t>
+            </a:r>
+            <a:r>
+              <a:rPr lang="da-DK" dirty="0"/>
+              <a:t> and a </a:t>
+            </a:r>
+            <a:r>
+              <a:rPr lang="da-DK" dirty="0" err="1"/>
+              <a:t>dynamically</a:t>
+            </a:r>
+            <a:r>
+              <a:rPr lang="da-DK" dirty="0"/>
+              <a:t> </a:t>
+            </a:r>
+            <a:r>
+              <a:rPr lang="da-DK" dirty="0" err="1"/>
+              <a:t>programmable</a:t>
+            </a:r>
+            <a:r>
+              <a:rPr lang="da-DK" dirty="0"/>
+              <a:t> </a:t>
+            </a:r>
+            <a:r>
+              <a:rPr lang="da-DK" dirty="0" err="1"/>
+              <a:t>function</a:t>
+            </a:r>
+            <a:r>
+              <a:rPr lang="da-DK" dirty="0"/>
+              <a:t> region</a:t>
+            </a:r>
+          </a:p>
+          <a:p>
+            <a:r>
+              <a:rPr lang="en-US" dirty="0"/>
+              <a:t>32</a:t>
+            </a:r>
+            <a:r>
+              <a:rPr lang="da-DK" altLang="zh-CN" dirty="0"/>
+              <a:t>-</a:t>
+            </a:r>
+            <a:r>
+              <a:rPr lang="en-US" altLang="zh-CN" dirty="0"/>
+              <a:t>bit</a:t>
+            </a:r>
+            <a:r>
+              <a:rPr lang="zh-CN" altLang="da-DK" dirty="0"/>
+              <a:t> </a:t>
+            </a:r>
+            <a:r>
+              <a:rPr lang="en-US" altLang="zh-CN" dirty="0"/>
+              <a:t>floating</a:t>
+            </a:r>
+            <a:r>
+              <a:rPr lang="zh-CN" altLang="da-DK" dirty="0"/>
+              <a:t> </a:t>
+            </a:r>
+            <a:r>
+              <a:rPr lang="en-US" altLang="zh-CN" dirty="0"/>
+              <a:t>point</a:t>
+            </a:r>
+            <a:r>
+              <a:rPr lang="zh-CN" altLang="da-DK" dirty="0"/>
+              <a:t> </a:t>
+            </a:r>
+            <a:r>
+              <a:rPr lang="en-US" altLang="zh-CN" dirty="0"/>
+              <a:t>precision</a:t>
+            </a:r>
+          </a:p>
+          <a:p>
+            <a:r>
+              <a:rPr lang="en-US" dirty="0"/>
+              <a:t>All control logic and collections are handled by the configuration bus from the host processor</a:t>
+            </a:r>
+          </a:p>
+        </p:txBody>
+      </p:sp>
+    </p:spTree>
+    <p:extLst>
+      <p:ext uri="{BB962C8B-B14F-4D97-AF65-F5344CB8AC3E}">
+        <p14:creationId xmlns:p14="http://schemas.microsoft.com/office/powerpoint/2010/main" val="1460023495"/>
+      </p:ext>
+    </p:extLst>
+  </p:cSld>
+  <p:clrMapOvr>
+    <a:masterClrMapping/>
+  </p:clrMapOvr>
+</p:sld>
+</file>
+
+<file path=ppt/slides/slide18.xml><?xml version="1.0" encoding="utf-8"?>
+<p:sld xmlns:a="http://schemas.openxmlformats.org/drawingml/2006/main" xmlns:r="http://schemas.openxmlformats.org/officeDocument/2006/relationships" xmlns:p="http://schemas.openxmlformats.org/presentationml/2006/main">
+  <p:cSld>
+    <p:spTree>
+      <p:nvGrpSpPr>
+        <p:cNvPr id="1" name=""/>
+        <p:cNvGrpSpPr/>
+        <p:nvPr/>
+      </p:nvGrpSpPr>
+      <p:grpSpPr>
+        <a:xfrm>
+          <a:off x="0" y="0"/>
+          <a:ext cx="0" cy="0"/>
+          <a:chOff x="0" y="0"/>
+          <a:chExt cx="0" cy="0"/>
+        </a:xfrm>
+      </p:grpSpPr>
+      <p:sp>
+        <p:nvSpPr>
+          <p:cNvPr id="2" name="Title 1">
+            <a:extLst>
+              <a:ext uri="{FF2B5EF4-FFF2-40B4-BE49-F238E27FC236}">
+                <a16:creationId xmlns:a16="http://schemas.microsoft.com/office/drawing/2014/main" id="{6E002569-25EF-451C-8312-CDE2307B1165}"/>
+              </a:ext>
+            </a:extLst>
+          </p:cNvPr>
+          <p:cNvSpPr>
+            <a:spLocks noGrp="1"/>
+          </p:cNvSpPr>
+          <p:nvPr>
+            <p:ph type="title"/>
+          </p:nvPr>
+        </p:nvSpPr>
+        <p:spPr/>
+        <p:txBody>
+          <a:bodyPr/>
+          <a:lstStyle/>
+          <a:p>
+            <a:r>
+              <a:rPr lang="en-US" dirty="0" err="1"/>
+              <a:t>nn</a:t>
+            </a:r>
+            <a:r>
+              <a:rPr lang="en-US" dirty="0"/>
+              <a:t>-X Overall Architecture</a:t>
+            </a:r>
+          </a:p>
+        </p:txBody>
+      </p:sp>
+      <p:pic>
+        <p:nvPicPr>
+          <p:cNvPr id="4" name="Picture 3">
+            <a:extLst>
+              <a:ext uri="{FF2B5EF4-FFF2-40B4-BE49-F238E27FC236}">
+                <a16:creationId xmlns:a16="http://schemas.microsoft.com/office/drawing/2014/main" id="{FC67CC34-4FE3-4B36-BE4B-6273C632A3DF}"/>
+              </a:ext>
+            </a:extLst>
+          </p:cNvPr>
+          <p:cNvPicPr>
+            <a:picLocks noChangeAspect="1"/>
+          </p:cNvPicPr>
+          <p:nvPr/>
+        </p:nvPicPr>
+        <p:blipFill>
+          <a:blip r:embed="rId2"/>
+          <a:stretch>
+            <a:fillRect/>
+          </a:stretch>
+        </p:blipFill>
+        <p:spPr>
+          <a:xfrm>
+            <a:off x="0" y="1346175"/>
+            <a:ext cx="12192000" cy="5373014"/>
+          </a:xfrm>
+          <a:prstGeom prst="rect">
+            <a:avLst/>
+          </a:prstGeom>
+        </p:spPr>
+      </p:pic>
+    </p:spTree>
+    <p:extLst>
+      <p:ext uri="{BB962C8B-B14F-4D97-AF65-F5344CB8AC3E}">
+        <p14:creationId xmlns:p14="http://schemas.microsoft.com/office/powerpoint/2010/main" val="859389765"/>
+      </p:ext>
+    </p:extLst>
+  </p:cSld>
+  <p:clrMapOvr>
+    <a:masterClrMapping/>
+  </p:clrMapOvr>
+</p:sld>
+</file>
+
+<file path=ppt/slides/slide19.xml><?xml version="1.0" encoding="utf-8"?>
+<p:sld xmlns:a="http://schemas.openxmlformats.org/drawingml/2006/main" xmlns:r="http://schemas.openxmlformats.org/officeDocument/2006/relationships" xmlns:p="http://schemas.openxmlformats.org/presentationml/2006/main">
+  <p:cSld>
+    <p:spTree>
+      <p:nvGrpSpPr>
+        <p:cNvPr id="1" name=""/>
+        <p:cNvGrpSpPr/>
+        <p:nvPr/>
+      </p:nvGrpSpPr>
+      <p:grpSpPr>
+        <a:xfrm>
+          <a:off x="0" y="0"/>
+          <a:ext cx="0" cy="0"/>
+          <a:chOff x="0" y="0"/>
+          <a:chExt cx="0" cy="0"/>
+        </a:xfrm>
+      </p:grpSpPr>
+      <p:sp>
+        <p:nvSpPr>
+          <p:cNvPr id="2" name="Title 1">
+            <a:extLst>
+              <a:ext uri="{FF2B5EF4-FFF2-40B4-BE49-F238E27FC236}">
+                <a16:creationId xmlns:a16="http://schemas.microsoft.com/office/drawing/2014/main" id="{F20B2C66-07A7-4E59-85D1-3ACABA545EA5}"/>
+              </a:ext>
+            </a:extLst>
+          </p:cNvPr>
+          <p:cNvSpPr>
+            <a:spLocks noGrp="1"/>
+          </p:cNvSpPr>
+          <p:nvPr>
+            <p:ph type="title"/>
+          </p:nvPr>
+        </p:nvSpPr>
+        <p:spPr>
+          <a:xfrm>
+            <a:off x="1740023" y="624110"/>
+            <a:ext cx="9925235" cy="1280890"/>
+          </a:xfrm>
+        </p:spPr>
+        <p:txBody>
+          <a:bodyPr>
+            <a:noAutofit/>
+          </a:bodyPr>
+          <a:lstStyle/>
+          <a:p>
+            <a:r>
+              <a:rPr lang="en-US" sz="2600" dirty="0"/>
+              <a:t>A 288μW Programmable Deep-Learning Processor with 270KB On-Chip Weight Storage Using Non-Uniform Memory Hierarchy for Mobile Intelligence</a:t>
+            </a:r>
+          </a:p>
+        </p:txBody>
+      </p:sp>
+      <p:sp>
+        <p:nvSpPr>
+          <p:cNvPr id="3" name="Content Placeholder 2">
+            <a:extLst>
+              <a:ext uri="{FF2B5EF4-FFF2-40B4-BE49-F238E27FC236}">
+                <a16:creationId xmlns:a16="http://schemas.microsoft.com/office/drawing/2014/main" id="{9826BAC0-7AB3-4392-9DCF-D2A19538F5C3}"/>
+              </a:ext>
+            </a:extLst>
+          </p:cNvPr>
+          <p:cNvSpPr>
+            <a:spLocks noGrp="1"/>
+          </p:cNvSpPr>
+          <p:nvPr>
+            <p:ph idx="1"/>
+          </p:nvPr>
+        </p:nvSpPr>
+        <p:spPr>
+          <a:xfrm>
+            <a:off x="1740023" y="2133600"/>
+            <a:ext cx="9764589" cy="3777622"/>
+          </a:xfrm>
+        </p:spPr>
+        <p:txBody>
+          <a:bodyPr/>
+          <a:lstStyle/>
+          <a:p>
+            <a:r>
+              <a:rPr lang="en-US" dirty="0"/>
+              <a:t>Low power deep learning accelerator (low-power</a:t>
+            </a:r>
+            <a:r>
+              <a:rPr lang="zh-CN" altLang="da-DK" dirty="0"/>
+              <a:t> </a:t>
+            </a:r>
+            <a:r>
+              <a:rPr lang="en-US" altLang="zh-CN" dirty="0"/>
+              <a:t>achieved by storing all weights on-chip)</a:t>
+            </a:r>
+          </a:p>
+          <a:p>
+            <a:r>
+              <a:rPr lang="en-US" altLang="zh-CN" dirty="0"/>
+              <a:t>Four processing elements on chip with 270 kB memory (this sets a cap to the depth of the DNN)</a:t>
+            </a:r>
+          </a:p>
+          <a:p>
+            <a:r>
+              <a:rPr lang="en-US" altLang="zh-CN" dirty="0"/>
+              <a:t>NUMA memory hierarchy and reconfigurable fixed point representation (but not live dynamic)</a:t>
+            </a:r>
+          </a:p>
+          <a:p>
+            <a:r>
+              <a:rPr lang="en-US" altLang="zh-CN" dirty="0"/>
+              <a:t>NUMA results in 40% energy saving compared to a standard UMA</a:t>
+            </a:r>
+          </a:p>
+          <a:p>
+            <a:r>
+              <a:rPr lang="en-US" altLang="zh-CN" dirty="0"/>
+              <a:t>The non-linear activation functions are implemented with a lookup table</a:t>
+            </a:r>
+          </a:p>
+          <a:p>
+            <a:endParaRPr lang="en-US" altLang="zh-CN" dirty="0"/>
+          </a:p>
+          <a:p>
+            <a:endParaRPr lang="en-US" altLang="zh-CN" dirty="0"/>
+          </a:p>
+          <a:p>
+            <a:endParaRPr lang="en-US" altLang="zh-CN" dirty="0"/>
+          </a:p>
+          <a:p>
+            <a:endParaRPr lang="en-US" dirty="0"/>
+          </a:p>
+        </p:txBody>
+      </p:sp>
+    </p:spTree>
+    <p:extLst>
+      <p:ext uri="{BB962C8B-B14F-4D97-AF65-F5344CB8AC3E}">
+        <p14:creationId xmlns:p14="http://schemas.microsoft.com/office/powerpoint/2010/main" val="2459904368"/>
       </p:ext>
     </p:extLst>
   </p:cSld>
@@ -8218,6 +9431,401 @@
     <p:extLst>
       <p:ext uri="{BB962C8B-B14F-4D97-AF65-F5344CB8AC3E}">
         <p14:creationId xmlns:p14="http://schemas.microsoft.com/office/powerpoint/2010/main" val="4134638172"/>
+      </p:ext>
+    </p:extLst>
+  </p:cSld>
+  <p:clrMapOvr>
+    <a:masterClrMapping/>
+  </p:clrMapOvr>
+</p:sld>
+</file>
+
+<file path=ppt/slides/slide20.xml><?xml version="1.0" encoding="utf-8"?>
+<p:sld xmlns:a="http://schemas.openxmlformats.org/drawingml/2006/main" xmlns:r="http://schemas.openxmlformats.org/officeDocument/2006/relationships" xmlns:p="http://schemas.openxmlformats.org/presentationml/2006/main">
+  <p:cSld>
+    <p:spTree>
+      <p:nvGrpSpPr>
+        <p:cNvPr id="1" name=""/>
+        <p:cNvGrpSpPr/>
+        <p:nvPr/>
+      </p:nvGrpSpPr>
+      <p:grpSpPr>
+        <a:xfrm>
+          <a:off x="0" y="0"/>
+          <a:ext cx="0" cy="0"/>
+          <a:chOff x="0" y="0"/>
+          <a:chExt cx="0" cy="0"/>
+        </a:xfrm>
+      </p:grpSpPr>
+      <p:sp>
+        <p:nvSpPr>
+          <p:cNvPr id="2" name="Title 1">
+            <a:extLst>
+              <a:ext uri="{FF2B5EF4-FFF2-40B4-BE49-F238E27FC236}">
+                <a16:creationId xmlns:a16="http://schemas.microsoft.com/office/drawing/2014/main" id="{81FC2840-8512-4386-AE18-F38BDD15CFDD}"/>
+              </a:ext>
+            </a:extLst>
+          </p:cNvPr>
+          <p:cNvSpPr>
+            <a:spLocks noGrp="1"/>
+          </p:cNvSpPr>
+          <p:nvPr>
+            <p:ph type="title"/>
+          </p:nvPr>
+        </p:nvSpPr>
+        <p:spPr/>
+        <p:txBody>
+          <a:bodyPr/>
+          <a:lstStyle/>
+          <a:p>
+            <a:r>
+              <a:rPr lang="en-US" dirty="0"/>
+              <a:t>Architecture of the chip</a:t>
+            </a:r>
+          </a:p>
+        </p:txBody>
+      </p:sp>
+      <p:sp>
+        <p:nvSpPr>
+          <p:cNvPr id="3" name="Content Placeholder 2">
+            <a:extLst>
+              <a:ext uri="{FF2B5EF4-FFF2-40B4-BE49-F238E27FC236}">
+                <a16:creationId xmlns:a16="http://schemas.microsoft.com/office/drawing/2014/main" id="{31C29B5B-00F8-4AC9-8C98-FD87CA8524CC}"/>
+              </a:ext>
+            </a:extLst>
+          </p:cNvPr>
+          <p:cNvSpPr>
+            <a:spLocks noGrp="1"/>
+          </p:cNvSpPr>
+          <p:nvPr>
+            <p:ph idx="1"/>
+          </p:nvPr>
+        </p:nvSpPr>
+        <p:spPr/>
+        <p:txBody>
+          <a:bodyPr/>
+          <a:lstStyle/>
+          <a:p>
+            <a:endParaRPr lang="en-US"/>
+          </a:p>
+        </p:txBody>
+      </p:sp>
+      <p:pic>
+        <p:nvPicPr>
+          <p:cNvPr id="4" name="Picture 3">
+            <a:extLst>
+              <a:ext uri="{FF2B5EF4-FFF2-40B4-BE49-F238E27FC236}">
+                <a16:creationId xmlns:a16="http://schemas.microsoft.com/office/drawing/2014/main" id="{8307505E-C20E-4831-B4A5-E277B98EAC55}"/>
+              </a:ext>
+            </a:extLst>
+          </p:cNvPr>
+          <p:cNvPicPr>
+            <a:picLocks noChangeAspect="1"/>
+          </p:cNvPicPr>
+          <p:nvPr/>
+        </p:nvPicPr>
+        <p:blipFill>
+          <a:blip r:embed="rId2"/>
+          <a:stretch>
+            <a:fillRect/>
+          </a:stretch>
+        </p:blipFill>
+        <p:spPr>
+          <a:xfrm>
+            <a:off x="62144" y="1452452"/>
+            <a:ext cx="12192000" cy="5281260"/>
+          </a:xfrm>
+          <a:prstGeom prst="rect">
+            <a:avLst/>
+          </a:prstGeom>
+        </p:spPr>
+      </p:pic>
+    </p:spTree>
+    <p:extLst>
+      <p:ext uri="{BB962C8B-B14F-4D97-AF65-F5344CB8AC3E}">
+        <p14:creationId xmlns:p14="http://schemas.microsoft.com/office/powerpoint/2010/main" val="3378543002"/>
+      </p:ext>
+    </p:extLst>
+  </p:cSld>
+  <p:clrMapOvr>
+    <a:masterClrMapping/>
+  </p:clrMapOvr>
+</p:sld>
+</file>
+
+<file path=ppt/slides/slide21.xml><?xml version="1.0" encoding="utf-8"?>
+<p:sld xmlns:a="http://schemas.openxmlformats.org/drawingml/2006/main" xmlns:r="http://schemas.openxmlformats.org/officeDocument/2006/relationships" xmlns:p="http://schemas.openxmlformats.org/presentationml/2006/main">
+  <p:cSld>
+    <p:spTree>
+      <p:nvGrpSpPr>
+        <p:cNvPr id="1" name=""/>
+        <p:cNvGrpSpPr/>
+        <p:nvPr/>
+      </p:nvGrpSpPr>
+      <p:grpSpPr>
+        <a:xfrm>
+          <a:off x="0" y="0"/>
+          <a:ext cx="0" cy="0"/>
+          <a:chOff x="0" y="0"/>
+          <a:chExt cx="0" cy="0"/>
+        </a:xfrm>
+      </p:grpSpPr>
+      <p:sp>
+        <p:nvSpPr>
+          <p:cNvPr id="2" name="Title 1">
+            <a:extLst>
+              <a:ext uri="{FF2B5EF4-FFF2-40B4-BE49-F238E27FC236}">
+                <a16:creationId xmlns:a16="http://schemas.microsoft.com/office/drawing/2014/main" id="{31E12B0C-BCEE-41CB-9879-9A60BA1A07F0}"/>
+              </a:ext>
+            </a:extLst>
+          </p:cNvPr>
+          <p:cNvSpPr>
+            <a:spLocks noGrp="1"/>
+          </p:cNvSpPr>
+          <p:nvPr>
+            <p:ph type="title"/>
+          </p:nvPr>
+        </p:nvSpPr>
+        <p:spPr/>
+        <p:txBody>
+          <a:bodyPr/>
+          <a:lstStyle/>
+          <a:p>
+            <a:r>
+              <a:rPr lang="en-US" dirty="0"/>
+              <a:t>Architecture Superimposed on the Die </a:t>
+            </a:r>
+          </a:p>
+        </p:txBody>
+      </p:sp>
+      <p:pic>
+        <p:nvPicPr>
+          <p:cNvPr id="4" name="Picture 3">
+            <a:extLst>
+              <a:ext uri="{FF2B5EF4-FFF2-40B4-BE49-F238E27FC236}">
+                <a16:creationId xmlns:a16="http://schemas.microsoft.com/office/drawing/2014/main" id="{899E8FCB-93A2-41C4-AC6D-B36FCC8EFD08}"/>
+              </a:ext>
+            </a:extLst>
+          </p:cNvPr>
+          <p:cNvPicPr>
+            <a:picLocks noChangeAspect="1"/>
+          </p:cNvPicPr>
+          <p:nvPr/>
+        </p:nvPicPr>
+        <p:blipFill>
+          <a:blip r:embed="rId2"/>
+          <a:stretch>
+            <a:fillRect/>
+          </a:stretch>
+        </p:blipFill>
+        <p:spPr>
+          <a:xfrm>
+            <a:off x="3790766" y="1374033"/>
+            <a:ext cx="4823626" cy="5118317"/>
+          </a:xfrm>
+          <a:prstGeom prst="rect">
+            <a:avLst/>
+          </a:prstGeom>
+        </p:spPr>
+      </p:pic>
+    </p:spTree>
+    <p:extLst>
+      <p:ext uri="{BB962C8B-B14F-4D97-AF65-F5344CB8AC3E}">
+        <p14:creationId xmlns:p14="http://schemas.microsoft.com/office/powerpoint/2010/main" val="2997320618"/>
+      </p:ext>
+    </p:extLst>
+  </p:cSld>
+  <p:clrMapOvr>
+    <a:masterClrMapping/>
+  </p:clrMapOvr>
+</p:sld>
+</file>
+
+<file path=ppt/slides/slide22.xml><?xml version="1.0" encoding="utf-8"?>
+<p:sld xmlns:a="http://schemas.openxmlformats.org/drawingml/2006/main" xmlns:r="http://schemas.openxmlformats.org/officeDocument/2006/relationships" xmlns:p="http://schemas.openxmlformats.org/presentationml/2006/main">
+  <p:cSld>
+    <p:spTree>
+      <p:nvGrpSpPr>
+        <p:cNvPr id="1" name=""/>
+        <p:cNvGrpSpPr/>
+        <p:nvPr/>
+      </p:nvGrpSpPr>
+      <p:grpSpPr>
+        <a:xfrm>
+          <a:off x="0" y="0"/>
+          <a:ext cx="0" cy="0"/>
+          <a:chOff x="0" y="0"/>
+          <a:chExt cx="0" cy="0"/>
+        </a:xfrm>
+      </p:grpSpPr>
+      <p:sp>
+        <p:nvSpPr>
+          <p:cNvPr id="2" name="Title 1">
+            <a:extLst>
+              <a:ext uri="{FF2B5EF4-FFF2-40B4-BE49-F238E27FC236}">
+                <a16:creationId xmlns:a16="http://schemas.microsoft.com/office/drawing/2014/main" id="{8347EE27-451B-4924-B440-0EDACE436ADF}"/>
+              </a:ext>
+            </a:extLst>
+          </p:cNvPr>
+          <p:cNvSpPr>
+            <a:spLocks noGrp="1"/>
+          </p:cNvSpPr>
+          <p:nvPr>
+            <p:ph type="title"/>
+          </p:nvPr>
+        </p:nvSpPr>
+        <p:spPr>
+          <a:xfrm>
+            <a:off x="1713391" y="624110"/>
+            <a:ext cx="9791222" cy="1280890"/>
+          </a:xfrm>
+        </p:spPr>
+        <p:txBody>
+          <a:bodyPr/>
+          <a:lstStyle/>
+          <a:p>
+            <a:r>
+              <a:rPr lang="en-US" altLang="zh-CN"/>
+              <a:t>Going forward</a:t>
+            </a:r>
+            <a:endParaRPr lang="zh-CN" altLang="en-US" dirty="0"/>
+          </a:p>
+        </p:txBody>
+      </p:sp>
+      <p:sp>
+        <p:nvSpPr>
+          <p:cNvPr id="3" name="Content Placeholder 2">
+            <a:extLst>
+              <a:ext uri="{FF2B5EF4-FFF2-40B4-BE49-F238E27FC236}">
+                <a16:creationId xmlns:a16="http://schemas.microsoft.com/office/drawing/2014/main" id="{247D4736-6C18-4580-BE29-751BA4EBA23B}"/>
+              </a:ext>
+            </a:extLst>
+          </p:cNvPr>
+          <p:cNvSpPr>
+            <a:spLocks noGrp="1"/>
+          </p:cNvSpPr>
+          <p:nvPr>
+            <p:ph idx="1"/>
+          </p:nvPr>
+        </p:nvSpPr>
+        <p:spPr>
+          <a:xfrm>
+            <a:off x="1713390" y="1709530"/>
+            <a:ext cx="9791222" cy="5001988"/>
+          </a:xfrm>
+        </p:spPr>
+        <p:txBody>
+          <a:bodyPr>
+            <a:normAutofit fontScale="92500" lnSpcReduction="20000"/>
+          </a:bodyPr>
+          <a:lstStyle/>
+          <a:p>
+            <a:r>
+              <a:rPr lang="en-US" altLang="zh-CN" dirty="0"/>
+              <a:t>Application: 		Inference, or both inference and training?</a:t>
+            </a:r>
+          </a:p>
+          <a:p>
+            <a:pPr lvl="1"/>
+            <a:r>
+              <a:rPr lang="en-US" altLang="zh-CN" dirty="0"/>
+              <a:t>I would like to try both inference and training</a:t>
+            </a:r>
+          </a:p>
+          <a:p>
+            <a:r>
+              <a:rPr lang="en-US" altLang="zh-CN" dirty="0"/>
+              <a:t>Precision: 		Floating point, dynamic fixed point, static fixed point?</a:t>
+            </a:r>
+          </a:p>
+          <a:p>
+            <a:pPr lvl="1"/>
+            <a:r>
+              <a:rPr lang="en-US" altLang="zh-CN" dirty="0"/>
+              <a:t>Static fixed point for now</a:t>
+            </a:r>
+          </a:p>
+          <a:p>
+            <a:r>
+              <a:rPr lang="en-US" altLang="zh-CN" dirty="0"/>
+              <a:t>Architecture: 	MAC PE’s, Modular PE’s, Modular-generated?</a:t>
+            </a:r>
+          </a:p>
+          <a:p>
+            <a:pPr lvl="1"/>
+            <a:r>
+              <a:rPr lang="en-US" altLang="zh-CN" dirty="0"/>
+              <a:t>Up for discussion. Perhaps a modular PE or modular generated would be easier.</a:t>
+            </a:r>
+          </a:p>
+          <a:p>
+            <a:r>
+              <a:rPr lang="en-US" altLang="zh-CN" dirty="0"/>
+              <a:t>Network to train: 	</a:t>
+            </a:r>
+            <a:r>
+              <a:rPr lang="en-US" altLang="zh-CN" dirty="0" err="1"/>
+              <a:t>LeNet</a:t>
+            </a:r>
+            <a:r>
+              <a:rPr lang="en-US" altLang="zh-CN" dirty="0"/>
+              <a:t>? CIFAR? ImageNet? </a:t>
+            </a:r>
+          </a:p>
+          <a:p>
+            <a:pPr lvl="1"/>
+            <a:r>
+              <a:rPr lang="en-US" altLang="zh-CN" dirty="0" err="1"/>
+              <a:t>LeNet</a:t>
+            </a:r>
+            <a:r>
+              <a:rPr lang="en-US" altLang="zh-CN" dirty="0"/>
+              <a:t> is quite easy to achieve high accuracy, might not give a good reflection of the effect of reduced precision from FP. ImageNet is a massive scale set. CIFAR is a medium size dataset and the images are relatively non-massive. Therefore, I suggest CIFAR as the dataset to train a network on</a:t>
+            </a:r>
+          </a:p>
+          <a:p>
+            <a:r>
+              <a:rPr lang="en-US" altLang="zh-CN" dirty="0"/>
+              <a:t>Comparison:		How to build CPU- and GPU-based models?</a:t>
+            </a:r>
+          </a:p>
+          <a:p>
+            <a:pPr lvl="1"/>
+            <a:r>
+              <a:rPr lang="en-US" altLang="zh-CN" dirty="0"/>
+              <a:t>TensorFlow</a:t>
+            </a:r>
+          </a:p>
+          <a:p>
+            <a:r>
+              <a:rPr lang="en-US" altLang="zh-CN" dirty="0"/>
+              <a:t>Activation:		What non-linear activation function should be used?</a:t>
+            </a:r>
+          </a:p>
+          <a:p>
+            <a:pPr lvl="1"/>
+            <a:r>
+              <a:rPr lang="en-US" altLang="zh-CN" dirty="0" err="1"/>
+              <a:t>ReLU</a:t>
+            </a:r>
+            <a:r>
+              <a:rPr lang="en-US" altLang="zh-CN" dirty="0"/>
+              <a:t> to save our LU’s and reduce cycles required for computation</a:t>
+            </a:r>
+          </a:p>
+          <a:p>
+            <a:r>
+              <a:rPr lang="en-US" altLang="zh-CN" dirty="0"/>
+              <a:t>Need: DRAM to store training data. SoC, ideally with a nice chunk of memory to store weights and partial results to minimize DRAM accesses</a:t>
+            </a:r>
+            <a:endParaRPr lang="zh-CN" altLang="en-US" dirty="0"/>
+          </a:p>
+        </p:txBody>
+      </p:sp>
+    </p:spTree>
+    <p:extLst>
+      <p:ext uri="{BB962C8B-B14F-4D97-AF65-F5344CB8AC3E}">
+        <p14:creationId xmlns:p14="http://schemas.microsoft.com/office/powerpoint/2010/main" val="145792680"/>
       </p:ext>
     </p:extLst>
   </p:cSld>
@@ -8741,8 +10349,38 @@
         </p:blipFill>
         <p:spPr>
           <a:xfrm>
-            <a:off x="3430398" y="2894072"/>
+            <a:off x="553658" y="2947338"/>
             <a:ext cx="5331204" cy="3764374"/>
+          </a:xfrm>
+          <a:prstGeom prst="rect">
+            <a:avLst/>
+          </a:prstGeom>
+        </p:spPr>
+      </p:pic>
+      <p:pic>
+        <p:nvPicPr>
+          <p:cNvPr id="5" name="Picture 4">
+            <a:extLst>
+              <a:ext uri="{FF2B5EF4-FFF2-40B4-BE49-F238E27FC236}">
+                <a16:creationId xmlns:a16="http://schemas.microsoft.com/office/drawing/2014/main" id="{3DCB40AF-2498-4BB3-B6F7-1AADA1BC7C40}"/>
+              </a:ext>
+            </a:extLst>
+          </p:cNvPr>
+          <p:cNvPicPr>
+            <a:picLocks noChangeAspect="1"/>
+          </p:cNvPicPr>
+          <p:nvPr/>
+        </p:nvPicPr>
+        <p:blipFill>
+          <a:blip r:embed="rId3"/>
+          <a:stretch>
+            <a:fillRect/>
+          </a:stretch>
+        </p:blipFill>
+        <p:spPr>
+          <a:xfrm>
+            <a:off x="6096000" y="3889387"/>
+            <a:ext cx="5619750" cy="1485900"/>
           </a:xfrm>
           <a:prstGeom prst="rect">
             <a:avLst/>

</xml_diff>

<commit_message>
Have the CPU/GPU models running. Kind of want to improve the amount of memory i can use in the gpu model but for now im a bit limited in how big the model can get
</commit_message>
<xml_diff>
--- a/WeeklyPresentations/update1_02_11.pptx
+++ b/WeeklyPresentations/update1_02_11.pptx
@@ -8582,15 +8582,11 @@
             </a:r>
             <a:r>
               <a:rPr lang="da-DK" dirty="0"/>
-              <a:t> and </a:t>
-            </a:r>
-            <a:r>
-              <a:rPr lang="da-DK" dirty="0" err="1"/>
-              <a:t>baises</a:t>
-            </a:r>
-            <a:r>
-              <a:rPr lang="da-DK" dirty="0"/>
               <a:t> </a:t>
+            </a:r>
+            <a:r>
+              <a:rPr lang="da-DK"/>
+              <a:t>and biases </a:t>
             </a:r>
             <a:r>
               <a:rPr lang="da-DK" dirty="0" err="1"/>

</xml_diff>